<commit_message>
Powerpoint writer: use reference-doc font for captions. (#10835)
Closes #9896.
</commit_message>
<xml_diff>
--- a/test/pptx/background-image/output.pptx
+++ b/test/pptx/background-image/output.pptx
@@ -3981,7 +3981,9 @@
         <p:nvSpPr>
           <p:cNvPr id="1" name="TextBox 3"/>
           <p:cNvSpPr txBox="1"/>
-          <p:nvPr/>
+          <p:nvPr>
+            <p:ph idx="1"/>
+          </p:nvPr>
         </p:nvSpPr>
         <p:spPr>
           <a:xfrm>

</xml_diff>